<commit_message>
updates slides to include review
</commit_message>
<xml_diff>
--- a/slides/LinearStructures.pptx
+++ b/slides/LinearStructures.pptx
@@ -6,17 +6,23 @@
   </p:sldMasterIdLst>
   <p:sldIdLst>
     <p:sldId id="256" r:id="rId2"/>
-    <p:sldId id="257" r:id="rId3"/>
-    <p:sldId id="258" r:id="rId4"/>
-    <p:sldId id="260" r:id="rId5"/>
-    <p:sldId id="264" r:id="rId6"/>
-    <p:sldId id="261" r:id="rId7"/>
-    <p:sldId id="265" r:id="rId8"/>
-    <p:sldId id="263" r:id="rId9"/>
-    <p:sldId id="266" r:id="rId10"/>
-    <p:sldId id="267" r:id="rId11"/>
-    <p:sldId id="268" r:id="rId12"/>
-    <p:sldId id="269" r:id="rId13"/>
+    <p:sldId id="273" r:id="rId3"/>
+    <p:sldId id="257" r:id="rId4"/>
+    <p:sldId id="258" r:id="rId5"/>
+    <p:sldId id="260" r:id="rId6"/>
+    <p:sldId id="270" r:id="rId7"/>
+    <p:sldId id="264" r:id="rId8"/>
+    <p:sldId id="261" r:id="rId9"/>
+    <p:sldId id="271" r:id="rId10"/>
+    <p:sldId id="265" r:id="rId11"/>
+    <p:sldId id="263" r:id="rId12"/>
+    <p:sldId id="272" r:id="rId13"/>
+    <p:sldId id="266" r:id="rId14"/>
+    <p:sldId id="267" r:id="rId15"/>
+    <p:sldId id="274" r:id="rId16"/>
+    <p:sldId id="275" r:id="rId17"/>
+    <p:sldId id="268" r:id="rId18"/>
+    <p:sldId id="269" r:id="rId19"/>
   </p:sldIdLst>
   <p:sldSz cx="12192000" cy="6858000"/>
   <p:notesSz cx="6858000" cy="9144000"/>
@@ -115,6 +121,11 @@
       </a:defRPr>
     </a:lvl9pPr>
   </p:defaultTextStyle>
+  <p:extLst>
+    <p:ext uri="{EFAFB233-063F-42B5-8137-9DF3F51BA10A}">
+      <p15:sldGuideLst xmlns:p15="http://schemas.microsoft.com/office/powerpoint/2012/main"/>
+    </p:ext>
+  </p:extLst>
 </p:presentation>
 </file>
 
@@ -466,7 +477,7 @@
           <a:p>
             <a:fld id="{3CADBD16-5BFB-4D9F-9646-C75D1B53BBB6}" type="datetimeFigureOut">
               <a:rPr lang="en-US" smtClean="0"/>
-              <a:t>2/12/24</a:t>
+              <a:t>2/13/24</a:t>
             </a:fld>
             <a:endParaRPr lang="en-US"/>
           </a:p>
@@ -707,7 +718,7 @@
           <a:p>
             <a:fld id="{3CADBD16-5BFB-4D9F-9646-C75D1B53BBB6}" type="datetimeFigureOut">
               <a:rPr lang="en-US" smtClean="0"/>
-              <a:t>2/12/24</a:t>
+              <a:t>2/13/24</a:t>
             </a:fld>
             <a:endParaRPr lang="en-US"/>
           </a:p>
@@ -915,7 +926,7 @@
           <a:p>
             <a:fld id="{3CADBD16-5BFB-4D9F-9646-C75D1B53BBB6}" type="datetimeFigureOut">
               <a:rPr lang="en-US" smtClean="0"/>
-              <a:t>2/12/24</a:t>
+              <a:t>2/13/24</a:t>
             </a:fld>
             <a:endParaRPr lang="en-US"/>
           </a:p>
@@ -1113,7 +1124,7 @@
           <a:p>
             <a:fld id="{3CADBD16-5BFB-4D9F-9646-C75D1B53BBB6}" type="datetimeFigureOut">
               <a:rPr lang="en-US" smtClean="0"/>
-              <a:t>2/12/24</a:t>
+              <a:t>2/13/24</a:t>
             </a:fld>
             <a:endParaRPr lang="en-US"/>
           </a:p>
@@ -1390,7 +1401,7 @@
           <a:p>
             <a:fld id="{3CADBD16-5BFB-4D9F-9646-C75D1B53BBB6}" type="datetimeFigureOut">
               <a:rPr lang="en-US" smtClean="0"/>
-              <a:t>2/12/24</a:t>
+              <a:t>2/13/24</a:t>
             </a:fld>
             <a:endParaRPr lang="en-US"/>
           </a:p>
@@ -1655,7 +1666,7 @@
           <a:p>
             <a:fld id="{3CADBD16-5BFB-4D9F-9646-C75D1B53BBB6}" type="datetimeFigureOut">
               <a:rPr lang="en-US" smtClean="0"/>
-              <a:t>2/12/24</a:t>
+              <a:t>2/13/24</a:t>
             </a:fld>
             <a:endParaRPr lang="en-US"/>
           </a:p>
@@ -2071,7 +2082,7 @@
           <a:p>
             <a:fld id="{3CADBD16-5BFB-4D9F-9646-C75D1B53BBB6}" type="datetimeFigureOut">
               <a:rPr lang="en-US" smtClean="0"/>
-              <a:t>2/12/24</a:t>
+              <a:t>2/13/24</a:t>
             </a:fld>
             <a:endParaRPr lang="en-US"/>
           </a:p>
@@ -2221,7 +2232,7 @@
           <a:p>
             <a:fld id="{3CADBD16-5BFB-4D9F-9646-C75D1B53BBB6}" type="datetimeFigureOut">
               <a:rPr lang="en-US" smtClean="0"/>
-              <a:t>2/12/24</a:t>
+              <a:t>2/13/24</a:t>
             </a:fld>
             <a:endParaRPr lang="en-US"/>
           </a:p>
@@ -2334,7 +2345,7 @@
           <a:p>
             <a:fld id="{3CADBD16-5BFB-4D9F-9646-C75D1B53BBB6}" type="datetimeFigureOut">
               <a:rPr lang="en-US" smtClean="0"/>
-              <a:t>2/12/24</a:t>
+              <a:t>2/13/24</a:t>
             </a:fld>
             <a:endParaRPr lang="en-US"/>
           </a:p>
@@ -2650,7 +2661,7 @@
           <a:p>
             <a:fld id="{3CADBD16-5BFB-4D9F-9646-C75D1B53BBB6}" type="datetimeFigureOut">
               <a:rPr lang="en-US" smtClean="0"/>
-              <a:t>2/12/24</a:t>
+              <a:t>2/13/24</a:t>
             </a:fld>
             <a:endParaRPr lang="en-US"/>
           </a:p>
@@ -2901,7 +2912,7 @@
           <a:p>
             <a:fld id="{3CADBD16-5BFB-4D9F-9646-C75D1B53BBB6}" type="datetimeFigureOut">
               <a:rPr lang="en-US" smtClean="0"/>
-              <a:t>2/12/24</a:t>
+              <a:t>2/13/24</a:t>
             </a:fld>
             <a:endParaRPr lang="en-US"/>
           </a:p>
@@ -3410,7 +3421,7 @@
             <a:fld id="{3CADBD16-5BFB-4D9F-9646-C75D1B53BBB6}" type="datetimeFigureOut">
               <a:rPr lang="en-US" smtClean="0"/>
               <a:pPr/>
-              <a:t>2/12/24</a:t>
+              <a:t>2/13/24</a:t>
             </a:fld>
             <a:endParaRPr lang="en-US" dirty="0"/>
           </a:p>
@@ -4272,7 +4283,7 @@
           <p:cNvPr id="2" name="Title 1">
             <a:extLst>
               <a:ext uri="{FF2B5EF4-FFF2-40B4-BE49-F238E27FC236}">
-                <a16:creationId xmlns:a16="http://schemas.microsoft.com/office/drawing/2014/main" id="{23860D7F-7244-584D-71DB-5F92F46C0AAB}"/>
+                <a16:creationId xmlns:a16="http://schemas.microsoft.com/office/drawing/2014/main" id="{417C1DF7-6061-3C3F-08C8-DFF124A3F3F7}"/>
               </a:ext>
             </a:extLst>
           </p:cNvPr>
@@ -4290,7 +4301,7 @@
           <a:p>
             <a:r>
               <a:rPr lang="en-US" dirty="0"/>
-              <a:t>Linear Structure Implementation</a:t>
+              <a:t>Stack Implementation</a:t>
             </a:r>
           </a:p>
         </p:txBody>
@@ -4300,7 +4311,7 @@
           <p:cNvPr id="3" name="Content Placeholder 2">
             <a:extLst>
               <a:ext uri="{FF2B5EF4-FFF2-40B4-BE49-F238E27FC236}">
-                <a16:creationId xmlns:a16="http://schemas.microsoft.com/office/drawing/2014/main" id="{3B6AB9F7-456C-CA4F-BBD7-CC2AB66A37AC}"/>
+                <a16:creationId xmlns:a16="http://schemas.microsoft.com/office/drawing/2014/main" id="{C19B6685-11F3-A342-C9C5-E513E8629675}"/>
               </a:ext>
             </a:extLst>
           </p:cNvPr>
@@ -4316,43 +4327,96 @@
           <a:bodyPr/>
           <a:lstStyle/>
           <a:p>
-            <a:r>
-              <a:rPr lang="en-US" dirty="0"/>
-              <a:t>As we’ve seen, we are able to implement linear structures in a number of different ways</a:t>
-            </a:r>
-          </a:p>
-          <a:p>
-            <a:r>
-              <a:rPr lang="en-US" dirty="0"/>
-              <a:t>Specifically there are two we can focus on</a:t>
-            </a:r>
-          </a:p>
-          <a:p>
-            <a:pPr marL="514350" lvl="1" indent="-285750">
-              <a:buFont typeface="Arial" panose="020B0604020202020204" pitchFamily="34" charset="0"/>
-              <a:buChar char="•"/>
-            </a:pPr>
-            <a:r>
-              <a:rPr lang="en-US" i="0" dirty="0"/>
-              <a:t>Arrays</a:t>
-            </a:r>
-          </a:p>
-          <a:p>
-            <a:pPr marL="514350" lvl="1" indent="-285750">
-              <a:buFont typeface="Arial" panose="020B0604020202020204" pitchFamily="34" charset="0"/>
-              <a:buChar char="•"/>
-            </a:pPr>
-            <a:r>
-              <a:rPr lang="en-US" i="0" dirty="0"/>
-              <a:t>Linked List</a:t>
-            </a:r>
+            <a:endParaRPr lang="en-US"/>
+          </a:p>
+        </p:txBody>
+      </p:sp>
+      <p:pic>
+        <p:nvPicPr>
+          <p:cNvPr id="4" name="Picture 3">
+            <a:extLst>
+              <a:ext uri="{FF2B5EF4-FFF2-40B4-BE49-F238E27FC236}">
+                <a16:creationId xmlns:a16="http://schemas.microsoft.com/office/drawing/2014/main" id="{380967C0-3EE1-AA7A-9E72-4C23F93FAE02}"/>
+              </a:ext>
+            </a:extLst>
+          </p:cNvPr>
+          <p:cNvPicPr>
+            <a:picLocks noChangeAspect="1"/>
+          </p:cNvPicPr>
+          <p:nvPr/>
+        </p:nvPicPr>
+        <p:blipFill>
+          <a:blip r:embed="rId2"/>
+          <a:stretch>
+            <a:fillRect/>
+          </a:stretch>
+        </p:blipFill>
+        <p:spPr>
+          <a:xfrm>
+            <a:off x="1142999" y="2660650"/>
+            <a:ext cx="9905999" cy="2431290"/>
+          </a:xfrm>
+          <a:prstGeom prst="rect">
+            <a:avLst/>
+          </a:prstGeom>
+        </p:spPr>
+      </p:pic>
+      <p:sp>
+        <p:nvSpPr>
+          <p:cNvPr id="5" name="Rectangle 4">
+            <a:extLst>
+              <a:ext uri="{FF2B5EF4-FFF2-40B4-BE49-F238E27FC236}">
+                <a16:creationId xmlns:a16="http://schemas.microsoft.com/office/drawing/2014/main" id="{7FA8BC4A-332A-99D9-285E-8CFFAB11A40A}"/>
+              </a:ext>
+            </a:extLst>
+          </p:cNvPr>
+          <p:cNvSpPr/>
+          <p:nvPr/>
+        </p:nvSpPr>
+        <p:spPr>
+          <a:xfrm>
+            <a:off x="5602671" y="4717831"/>
+            <a:ext cx="767255" cy="241738"/>
+          </a:xfrm>
+          <a:prstGeom prst="rect">
+            <a:avLst/>
+          </a:prstGeom>
+          <a:noFill/>
+          <a:ln>
+            <a:solidFill>
+              <a:srgbClr val="FF0000"/>
+            </a:solidFill>
+          </a:ln>
+        </p:spPr>
+        <p:style>
+          <a:lnRef idx="2">
+            <a:schemeClr val="accent1">
+              <a:shade val="15000"/>
+            </a:schemeClr>
+          </a:lnRef>
+          <a:fillRef idx="1">
+            <a:schemeClr val="accent1"/>
+          </a:fillRef>
+          <a:effectRef idx="0">
+            <a:schemeClr val="accent1"/>
+          </a:effectRef>
+          <a:fontRef idx="minor">
+            <a:schemeClr val="lt1"/>
+          </a:fontRef>
+        </p:style>
+        <p:txBody>
+          <a:bodyPr rtlCol="0" anchor="ctr"/>
+          <a:lstStyle/>
+          <a:p>
+            <a:pPr algn="ctr"/>
+            <a:endParaRPr lang="en-US"/>
           </a:p>
         </p:txBody>
       </p:sp>
     </p:spTree>
     <p:extLst>
       <p:ext uri="{BB962C8B-B14F-4D97-AF65-F5344CB8AC3E}">
-        <p14:creationId xmlns:p14="http://schemas.microsoft.com/office/powerpoint/2010/main" val="2057004043"/>
+        <p14:creationId xmlns:p14="http://schemas.microsoft.com/office/powerpoint/2010/main" val="3255628329"/>
       </p:ext>
     </p:extLst>
   </p:cSld>
@@ -4363,6 +4427,354 @@
 </file>
 
 <file path=ppt/slides/slide11.xml><?xml version="1.0" encoding="utf-8"?>
+<p:sld xmlns:a="http://schemas.openxmlformats.org/drawingml/2006/main" xmlns:r="http://schemas.openxmlformats.org/officeDocument/2006/relationships" xmlns:p="http://schemas.openxmlformats.org/presentationml/2006/main">
+  <p:cSld>
+    <p:spTree>
+      <p:nvGrpSpPr>
+        <p:cNvPr id="1" name="">
+          <a:extLst>
+            <a:ext uri="{FF2B5EF4-FFF2-40B4-BE49-F238E27FC236}">
+              <a16:creationId xmlns:a16="http://schemas.microsoft.com/office/drawing/2014/main" id="{D3D1963C-8418-0D7B-6079-C3C8745D3148}"/>
+            </a:ext>
+          </a:extLst>
+        </p:cNvPr>
+        <p:cNvGrpSpPr/>
+        <p:nvPr/>
+      </p:nvGrpSpPr>
+      <p:grpSpPr>
+        <a:xfrm>
+          <a:off x="0" y="0"/>
+          <a:ext cx="0" cy="0"/>
+          <a:chOff x="0" y="0"/>
+          <a:chExt cx="0" cy="0"/>
+        </a:xfrm>
+      </p:grpSpPr>
+      <p:sp>
+        <p:nvSpPr>
+          <p:cNvPr id="2" name="Title 1">
+            <a:extLst>
+              <a:ext uri="{FF2B5EF4-FFF2-40B4-BE49-F238E27FC236}">
+                <a16:creationId xmlns:a16="http://schemas.microsoft.com/office/drawing/2014/main" id="{9C9FEB7E-D1A4-DD33-52E1-A121CA8136BF}"/>
+              </a:ext>
+            </a:extLst>
+          </p:cNvPr>
+          <p:cNvSpPr>
+            <a:spLocks noGrp="1"/>
+          </p:cNvSpPr>
+          <p:nvPr>
+            <p:ph type="title"/>
+          </p:nvPr>
+        </p:nvSpPr>
+        <p:spPr/>
+        <p:txBody>
+          <a:bodyPr/>
+          <a:lstStyle/>
+          <a:p>
+            <a:r>
+              <a:rPr lang="en-US" dirty="0"/>
+              <a:t>Queue ADT</a:t>
+            </a:r>
+          </a:p>
+        </p:txBody>
+      </p:sp>
+      <p:sp>
+        <p:nvSpPr>
+          <p:cNvPr id="5" name="TextBox 4">
+            <a:extLst>
+              <a:ext uri="{FF2B5EF4-FFF2-40B4-BE49-F238E27FC236}">
+                <a16:creationId xmlns:a16="http://schemas.microsoft.com/office/drawing/2014/main" id="{E14BFD4F-7E2C-E257-3882-A777504E5A6B}"/>
+              </a:ext>
+            </a:extLst>
+          </p:cNvPr>
+          <p:cNvSpPr txBox="1"/>
+          <p:nvPr/>
+        </p:nvSpPr>
+        <p:spPr>
+          <a:xfrm>
+            <a:off x="1143000" y="2039007"/>
+            <a:ext cx="9879724" cy="1298561"/>
+          </a:xfrm>
+          <a:prstGeom prst="rect">
+            <a:avLst/>
+          </a:prstGeom>
+          <a:noFill/>
+        </p:spPr>
+        <p:txBody>
+          <a:bodyPr wrap="square" rtlCol="0">
+            <a:spAutoFit/>
+          </a:bodyPr>
+          <a:lstStyle/>
+          <a:p>
+            <a:pPr marL="285750" indent="-285750">
+              <a:lnSpc>
+                <a:spcPct val="150000"/>
+              </a:lnSpc>
+              <a:buFont typeface="Arial" panose="020B0604020202020204" pitchFamily="34" charset="0"/>
+              <a:buChar char="•"/>
+            </a:pPr>
+            <a:r>
+              <a:rPr lang="en-US" dirty="0"/>
+              <a:t>A queue models a line of object</a:t>
+            </a:r>
+          </a:p>
+          <a:p>
+            <a:pPr marL="285750" indent="-285750">
+              <a:lnSpc>
+                <a:spcPct val="150000"/>
+              </a:lnSpc>
+              <a:buFont typeface="Arial" panose="020B0604020202020204" pitchFamily="34" charset="0"/>
+              <a:buChar char="•"/>
+            </a:pPr>
+            <a:r>
+              <a:rPr lang="en-US" dirty="0"/>
+              <a:t>Operates in a First In First Out Model - FIFO</a:t>
+            </a:r>
+          </a:p>
+          <a:p>
+            <a:pPr marL="285750" indent="-285750">
+              <a:lnSpc>
+                <a:spcPct val="150000"/>
+              </a:lnSpc>
+              <a:buFont typeface="Arial" panose="020B0604020202020204" pitchFamily="34" charset="0"/>
+              <a:buChar char="•"/>
+            </a:pPr>
+            <a:r>
+              <a:rPr lang="en-US" dirty="0"/>
+              <a:t>With each implementation there are four basic operations </a:t>
+            </a:r>
+          </a:p>
+        </p:txBody>
+      </p:sp>
+    </p:spTree>
+    <p:extLst>
+      <p:ext uri="{BB962C8B-B14F-4D97-AF65-F5344CB8AC3E}">
+        <p14:creationId xmlns:p14="http://schemas.microsoft.com/office/powerpoint/2010/main" val="3286999118"/>
+      </p:ext>
+    </p:extLst>
+  </p:cSld>
+  <p:clrMapOvr>
+    <a:masterClrMapping/>
+  </p:clrMapOvr>
+</p:sld>
+</file>
+
+<file path=ppt/slides/slide12.xml><?xml version="1.0" encoding="utf-8"?>
+<p:sld xmlns:a="http://schemas.openxmlformats.org/drawingml/2006/main" xmlns:r="http://schemas.openxmlformats.org/officeDocument/2006/relationships" xmlns:p="http://schemas.openxmlformats.org/presentationml/2006/main">
+  <p:cSld>
+    <p:spTree>
+      <p:nvGrpSpPr>
+        <p:cNvPr id="1" name="">
+          <a:extLst>
+            <a:ext uri="{FF2B5EF4-FFF2-40B4-BE49-F238E27FC236}">
+              <a16:creationId xmlns:a16="http://schemas.microsoft.com/office/drawing/2014/main" id="{55B59B1F-ADB8-6B8C-44A3-7F493D1A0DFF}"/>
+            </a:ext>
+          </a:extLst>
+        </p:cNvPr>
+        <p:cNvGrpSpPr/>
+        <p:nvPr/>
+      </p:nvGrpSpPr>
+      <p:grpSpPr>
+        <a:xfrm>
+          <a:off x="0" y="0"/>
+          <a:ext cx="0" cy="0"/>
+          <a:chOff x="0" y="0"/>
+          <a:chExt cx="0" cy="0"/>
+        </a:xfrm>
+      </p:grpSpPr>
+      <p:sp>
+        <p:nvSpPr>
+          <p:cNvPr id="2" name="Title 1">
+            <a:extLst>
+              <a:ext uri="{FF2B5EF4-FFF2-40B4-BE49-F238E27FC236}">
+                <a16:creationId xmlns:a16="http://schemas.microsoft.com/office/drawing/2014/main" id="{7E4471BB-ED6D-C5DA-0B33-549617C61E61}"/>
+              </a:ext>
+            </a:extLst>
+          </p:cNvPr>
+          <p:cNvSpPr>
+            <a:spLocks noGrp="1"/>
+          </p:cNvSpPr>
+          <p:nvPr>
+            <p:ph type="title"/>
+          </p:nvPr>
+        </p:nvSpPr>
+        <p:spPr/>
+        <p:txBody>
+          <a:bodyPr/>
+          <a:lstStyle/>
+          <a:p>
+            <a:r>
+              <a:rPr lang="en-US" dirty="0"/>
+              <a:t>Queue ADT</a:t>
+            </a:r>
+          </a:p>
+        </p:txBody>
+      </p:sp>
+      <p:sp>
+        <p:nvSpPr>
+          <p:cNvPr id="3" name="Content Placeholder 2">
+            <a:extLst>
+              <a:ext uri="{FF2B5EF4-FFF2-40B4-BE49-F238E27FC236}">
+                <a16:creationId xmlns:a16="http://schemas.microsoft.com/office/drawing/2014/main" id="{8DB92425-A52B-46C0-5606-32F734CD0798}"/>
+              </a:ext>
+            </a:extLst>
+          </p:cNvPr>
+          <p:cNvSpPr>
+            <a:spLocks noGrp="1"/>
+          </p:cNvSpPr>
+          <p:nvPr>
+            <p:ph sz="half" idx="1"/>
+          </p:nvPr>
+        </p:nvSpPr>
+        <p:spPr>
+          <a:xfrm>
+            <a:off x="1721072" y="3429000"/>
+            <a:ext cx="4798979" cy="2461098"/>
+          </a:xfrm>
+        </p:spPr>
+        <p:txBody>
+          <a:bodyPr/>
+          <a:lstStyle/>
+          <a:p>
+            <a:r>
+              <a:rPr lang="en-US" dirty="0"/>
+              <a:t>size</a:t>
+            </a:r>
+          </a:p>
+          <a:p>
+            <a:r>
+              <a:rPr lang="en-US" dirty="0"/>
+              <a:t>add</a:t>
+            </a:r>
+          </a:p>
+        </p:txBody>
+      </p:sp>
+      <p:sp>
+        <p:nvSpPr>
+          <p:cNvPr id="4" name="Content Placeholder 3">
+            <a:extLst>
+              <a:ext uri="{FF2B5EF4-FFF2-40B4-BE49-F238E27FC236}">
+                <a16:creationId xmlns:a16="http://schemas.microsoft.com/office/drawing/2014/main" id="{039DCEB2-B15C-19BF-A63D-429DB85071A6}"/>
+              </a:ext>
+            </a:extLst>
+          </p:cNvPr>
+          <p:cNvSpPr>
+            <a:spLocks noGrp="1"/>
+          </p:cNvSpPr>
+          <p:nvPr>
+            <p:ph sz="half" idx="2"/>
+          </p:nvPr>
+        </p:nvSpPr>
+        <p:spPr>
+          <a:xfrm>
+            <a:off x="3107427" y="3399905"/>
+            <a:ext cx="4798980" cy="2461098"/>
+          </a:xfrm>
+        </p:spPr>
+        <p:txBody>
+          <a:bodyPr/>
+          <a:lstStyle/>
+          <a:p>
+            <a:r>
+              <a:rPr lang="en-US" dirty="0"/>
+              <a:t>remove</a:t>
+            </a:r>
+          </a:p>
+          <a:p>
+            <a:r>
+              <a:rPr lang="en-US" dirty="0"/>
+              <a:t>peek</a:t>
+            </a:r>
+          </a:p>
+          <a:p>
+            <a:pPr marL="0" indent="0">
+              <a:buNone/>
+            </a:pPr>
+            <a:endParaRPr lang="en-US" dirty="0"/>
+          </a:p>
+        </p:txBody>
+      </p:sp>
+      <p:sp>
+        <p:nvSpPr>
+          <p:cNvPr id="5" name="TextBox 4">
+            <a:extLst>
+              <a:ext uri="{FF2B5EF4-FFF2-40B4-BE49-F238E27FC236}">
+                <a16:creationId xmlns:a16="http://schemas.microsoft.com/office/drawing/2014/main" id="{7C5DF28F-7359-1C61-0529-FEF1D9DFBA4A}"/>
+              </a:ext>
+            </a:extLst>
+          </p:cNvPr>
+          <p:cNvSpPr txBox="1"/>
+          <p:nvPr/>
+        </p:nvSpPr>
+        <p:spPr>
+          <a:xfrm>
+            <a:off x="1143000" y="2039007"/>
+            <a:ext cx="9879724" cy="1298561"/>
+          </a:xfrm>
+          <a:prstGeom prst="rect">
+            <a:avLst/>
+          </a:prstGeom>
+          <a:noFill/>
+        </p:spPr>
+        <p:txBody>
+          <a:bodyPr wrap="square" rtlCol="0">
+            <a:spAutoFit/>
+          </a:bodyPr>
+          <a:lstStyle/>
+          <a:p>
+            <a:pPr marL="285750" indent="-285750">
+              <a:lnSpc>
+                <a:spcPct val="150000"/>
+              </a:lnSpc>
+              <a:buFont typeface="Arial" panose="020B0604020202020204" pitchFamily="34" charset="0"/>
+              <a:buChar char="•"/>
+            </a:pPr>
+            <a:r>
+              <a:rPr lang="en-US" dirty="0"/>
+              <a:t>A queue models a line of object</a:t>
+            </a:r>
+          </a:p>
+          <a:p>
+            <a:pPr marL="285750" indent="-285750">
+              <a:lnSpc>
+                <a:spcPct val="150000"/>
+              </a:lnSpc>
+              <a:buFont typeface="Arial" panose="020B0604020202020204" pitchFamily="34" charset="0"/>
+              <a:buChar char="•"/>
+            </a:pPr>
+            <a:r>
+              <a:rPr lang="en-US" dirty="0"/>
+              <a:t>Operates in a First In First Out Model - FIFO</a:t>
+            </a:r>
+          </a:p>
+          <a:p>
+            <a:pPr marL="285750" indent="-285750">
+              <a:lnSpc>
+                <a:spcPct val="150000"/>
+              </a:lnSpc>
+              <a:buFont typeface="Arial" panose="020B0604020202020204" pitchFamily="34" charset="0"/>
+              <a:buChar char="•"/>
+            </a:pPr>
+            <a:r>
+              <a:rPr lang="en-US" dirty="0"/>
+              <a:t>With each implementation there are four basic operations </a:t>
+            </a:r>
+          </a:p>
+        </p:txBody>
+      </p:sp>
+    </p:spTree>
+    <p:extLst>
+      <p:ext uri="{BB962C8B-B14F-4D97-AF65-F5344CB8AC3E}">
+        <p14:creationId xmlns:p14="http://schemas.microsoft.com/office/powerpoint/2010/main" val="4023739396"/>
+      </p:ext>
+    </p:extLst>
+  </p:cSld>
+  <p:clrMapOvr>
+    <a:masterClrMapping/>
+  </p:clrMapOvr>
+</p:sld>
+</file>
+
+<file path=ppt/slides/slide13.xml><?xml version="1.0" encoding="utf-8"?>
 <p:sld xmlns:a="http://schemas.openxmlformats.org/drawingml/2006/main" xmlns:r="http://schemas.openxmlformats.org/officeDocument/2006/relationships" xmlns:p="http://schemas.openxmlformats.org/presentationml/2006/main">
   <p:cSld>
     <p:spTree>
@@ -4384,6 +4796,489 @@
           <p:cNvPr id="2" name="Title 1">
             <a:extLst>
               <a:ext uri="{FF2B5EF4-FFF2-40B4-BE49-F238E27FC236}">
+                <a16:creationId xmlns:a16="http://schemas.microsoft.com/office/drawing/2014/main" id="{B96B7663-AA47-2C7D-0BD6-71F7058990FD}"/>
+              </a:ext>
+            </a:extLst>
+          </p:cNvPr>
+          <p:cNvSpPr>
+            <a:spLocks noGrp="1"/>
+          </p:cNvSpPr>
+          <p:nvPr>
+            <p:ph type="title"/>
+          </p:nvPr>
+        </p:nvSpPr>
+        <p:spPr/>
+        <p:txBody>
+          <a:bodyPr/>
+          <a:lstStyle/>
+          <a:p>
+            <a:r>
+              <a:rPr lang="en-US" dirty="0"/>
+              <a:t>Queue ADT</a:t>
+            </a:r>
+          </a:p>
+        </p:txBody>
+      </p:sp>
+      <p:sp>
+        <p:nvSpPr>
+          <p:cNvPr id="3" name="Content Placeholder 2">
+            <a:extLst>
+              <a:ext uri="{FF2B5EF4-FFF2-40B4-BE49-F238E27FC236}">
+                <a16:creationId xmlns:a16="http://schemas.microsoft.com/office/drawing/2014/main" id="{EBBA4960-2F98-90D1-0E23-CF2F0471185A}"/>
+              </a:ext>
+            </a:extLst>
+          </p:cNvPr>
+          <p:cNvSpPr>
+            <a:spLocks noGrp="1"/>
+          </p:cNvSpPr>
+          <p:nvPr>
+            <p:ph idx="1"/>
+          </p:nvPr>
+        </p:nvSpPr>
+        <p:spPr/>
+        <p:txBody>
+          <a:bodyPr/>
+          <a:lstStyle/>
+          <a:p>
+            <a:endParaRPr lang="en-US" dirty="0"/>
+          </a:p>
+        </p:txBody>
+      </p:sp>
+      <p:pic>
+        <p:nvPicPr>
+          <p:cNvPr id="4" name="Picture 3">
+            <a:extLst>
+              <a:ext uri="{FF2B5EF4-FFF2-40B4-BE49-F238E27FC236}">
+                <a16:creationId xmlns:a16="http://schemas.microsoft.com/office/drawing/2014/main" id="{08676C5A-4A98-BA74-718C-309740D30C15}"/>
+              </a:ext>
+            </a:extLst>
+          </p:cNvPr>
+          <p:cNvPicPr>
+            <a:picLocks noChangeAspect="1"/>
+          </p:cNvPicPr>
+          <p:nvPr/>
+        </p:nvPicPr>
+        <p:blipFill>
+          <a:blip r:embed="rId2"/>
+          <a:stretch>
+            <a:fillRect/>
+          </a:stretch>
+        </p:blipFill>
+        <p:spPr>
+          <a:xfrm>
+            <a:off x="70990" y="2968607"/>
+            <a:ext cx="12050020" cy="2214319"/>
+          </a:xfrm>
+          <a:prstGeom prst="rect">
+            <a:avLst/>
+          </a:prstGeom>
+        </p:spPr>
+      </p:pic>
+      <p:sp>
+        <p:nvSpPr>
+          <p:cNvPr id="5" name="Rectangle 4">
+            <a:extLst>
+              <a:ext uri="{FF2B5EF4-FFF2-40B4-BE49-F238E27FC236}">
+                <a16:creationId xmlns:a16="http://schemas.microsoft.com/office/drawing/2014/main" id="{728717E3-00BB-3421-E418-4B62E7717897}"/>
+              </a:ext>
+            </a:extLst>
+          </p:cNvPr>
+          <p:cNvSpPr/>
+          <p:nvPr/>
+        </p:nvSpPr>
+        <p:spPr>
+          <a:xfrm>
+            <a:off x="8072602" y="4770382"/>
+            <a:ext cx="661495" cy="243051"/>
+          </a:xfrm>
+          <a:prstGeom prst="rect">
+            <a:avLst/>
+          </a:prstGeom>
+          <a:noFill/>
+          <a:ln>
+            <a:solidFill>
+              <a:srgbClr val="FF0000"/>
+            </a:solidFill>
+          </a:ln>
+        </p:spPr>
+        <p:style>
+          <a:lnRef idx="2">
+            <a:schemeClr val="accent1">
+              <a:shade val="15000"/>
+            </a:schemeClr>
+          </a:lnRef>
+          <a:fillRef idx="1">
+            <a:schemeClr val="accent1"/>
+          </a:fillRef>
+          <a:effectRef idx="0">
+            <a:schemeClr val="accent1"/>
+          </a:effectRef>
+          <a:fontRef idx="minor">
+            <a:schemeClr val="lt1"/>
+          </a:fontRef>
+        </p:style>
+        <p:txBody>
+          <a:bodyPr rtlCol="0" anchor="ctr"/>
+          <a:lstStyle/>
+          <a:p>
+            <a:pPr algn="ctr"/>
+            <a:endParaRPr lang="en-US"/>
+          </a:p>
+        </p:txBody>
+      </p:sp>
+    </p:spTree>
+    <p:extLst>
+      <p:ext uri="{BB962C8B-B14F-4D97-AF65-F5344CB8AC3E}">
+        <p14:creationId xmlns:p14="http://schemas.microsoft.com/office/powerpoint/2010/main" val="1187269324"/>
+      </p:ext>
+    </p:extLst>
+  </p:cSld>
+  <p:clrMapOvr>
+    <a:masterClrMapping/>
+  </p:clrMapOvr>
+</p:sld>
+</file>
+
+<file path=ppt/slides/slide14.xml><?xml version="1.0" encoding="utf-8"?>
+<p:sld xmlns:a="http://schemas.openxmlformats.org/drawingml/2006/main" xmlns:r="http://schemas.openxmlformats.org/officeDocument/2006/relationships" xmlns:p="http://schemas.openxmlformats.org/presentationml/2006/main">
+  <p:cSld>
+    <p:spTree>
+      <p:nvGrpSpPr>
+        <p:cNvPr id="1" name=""/>
+        <p:cNvGrpSpPr/>
+        <p:nvPr/>
+      </p:nvGrpSpPr>
+      <p:grpSpPr>
+        <a:xfrm>
+          <a:off x="0" y="0"/>
+          <a:ext cx="0" cy="0"/>
+          <a:chOff x="0" y="0"/>
+          <a:chExt cx="0" cy="0"/>
+        </a:xfrm>
+      </p:grpSpPr>
+      <p:sp>
+        <p:nvSpPr>
+          <p:cNvPr id="2" name="Title 1">
+            <a:extLst>
+              <a:ext uri="{FF2B5EF4-FFF2-40B4-BE49-F238E27FC236}">
+                <a16:creationId xmlns:a16="http://schemas.microsoft.com/office/drawing/2014/main" id="{23860D7F-7244-584D-71DB-5F92F46C0AAB}"/>
+              </a:ext>
+            </a:extLst>
+          </p:cNvPr>
+          <p:cNvSpPr>
+            <a:spLocks noGrp="1"/>
+          </p:cNvSpPr>
+          <p:nvPr>
+            <p:ph type="title"/>
+          </p:nvPr>
+        </p:nvSpPr>
+        <p:spPr/>
+        <p:txBody>
+          <a:bodyPr/>
+          <a:lstStyle/>
+          <a:p>
+            <a:r>
+              <a:rPr lang="en-US" dirty="0"/>
+              <a:t>Linear Structure Implementation</a:t>
+            </a:r>
+          </a:p>
+        </p:txBody>
+      </p:sp>
+      <p:sp>
+        <p:nvSpPr>
+          <p:cNvPr id="3" name="Content Placeholder 2">
+            <a:extLst>
+              <a:ext uri="{FF2B5EF4-FFF2-40B4-BE49-F238E27FC236}">
+                <a16:creationId xmlns:a16="http://schemas.microsoft.com/office/drawing/2014/main" id="{3B6AB9F7-456C-CA4F-BBD7-CC2AB66A37AC}"/>
+              </a:ext>
+            </a:extLst>
+          </p:cNvPr>
+          <p:cNvSpPr>
+            <a:spLocks noGrp="1"/>
+          </p:cNvSpPr>
+          <p:nvPr>
+            <p:ph idx="1"/>
+          </p:nvPr>
+        </p:nvSpPr>
+        <p:spPr/>
+        <p:txBody>
+          <a:bodyPr/>
+          <a:lstStyle/>
+          <a:p>
+            <a:r>
+              <a:rPr lang="en-US" dirty="0"/>
+              <a:t>As we’ve seen, we are able to implement linear structures in a number of different ways</a:t>
+            </a:r>
+          </a:p>
+          <a:p>
+            <a:r>
+              <a:rPr lang="en-US" dirty="0"/>
+              <a:t>Specifically there are two we can focus on</a:t>
+            </a:r>
+          </a:p>
+        </p:txBody>
+      </p:sp>
+    </p:spTree>
+    <p:extLst>
+      <p:ext uri="{BB962C8B-B14F-4D97-AF65-F5344CB8AC3E}">
+        <p14:creationId xmlns:p14="http://schemas.microsoft.com/office/powerpoint/2010/main" val="2057004043"/>
+      </p:ext>
+    </p:extLst>
+  </p:cSld>
+  <p:clrMapOvr>
+    <a:masterClrMapping/>
+  </p:clrMapOvr>
+</p:sld>
+</file>
+
+<file path=ppt/slides/slide15.xml><?xml version="1.0" encoding="utf-8"?>
+<p:sld xmlns:a="http://schemas.openxmlformats.org/drawingml/2006/main" xmlns:r="http://schemas.openxmlformats.org/officeDocument/2006/relationships" xmlns:p="http://schemas.openxmlformats.org/presentationml/2006/main">
+  <p:cSld>
+    <p:spTree>
+      <p:nvGrpSpPr>
+        <p:cNvPr id="1" name="">
+          <a:extLst>
+            <a:ext uri="{FF2B5EF4-FFF2-40B4-BE49-F238E27FC236}">
+              <a16:creationId xmlns:a16="http://schemas.microsoft.com/office/drawing/2014/main" id="{1BC1C68D-806D-5939-C2FB-8AB9FCACCAAC}"/>
+            </a:ext>
+          </a:extLst>
+        </p:cNvPr>
+        <p:cNvGrpSpPr/>
+        <p:nvPr/>
+      </p:nvGrpSpPr>
+      <p:grpSpPr>
+        <a:xfrm>
+          <a:off x="0" y="0"/>
+          <a:ext cx="0" cy="0"/>
+          <a:chOff x="0" y="0"/>
+          <a:chExt cx="0" cy="0"/>
+        </a:xfrm>
+      </p:grpSpPr>
+      <p:sp>
+        <p:nvSpPr>
+          <p:cNvPr id="2" name="Title 1">
+            <a:extLst>
+              <a:ext uri="{FF2B5EF4-FFF2-40B4-BE49-F238E27FC236}">
+                <a16:creationId xmlns:a16="http://schemas.microsoft.com/office/drawing/2014/main" id="{5227870E-0FF0-5FA8-78D9-E4593B2F4CB9}"/>
+              </a:ext>
+            </a:extLst>
+          </p:cNvPr>
+          <p:cNvSpPr>
+            <a:spLocks noGrp="1"/>
+          </p:cNvSpPr>
+          <p:nvPr>
+            <p:ph type="title"/>
+          </p:nvPr>
+        </p:nvSpPr>
+        <p:spPr/>
+        <p:txBody>
+          <a:bodyPr/>
+          <a:lstStyle/>
+          <a:p>
+            <a:r>
+              <a:rPr lang="en-US" dirty="0"/>
+              <a:t>Linear Structure Implementation</a:t>
+            </a:r>
+          </a:p>
+        </p:txBody>
+      </p:sp>
+      <p:sp>
+        <p:nvSpPr>
+          <p:cNvPr id="3" name="Content Placeholder 2">
+            <a:extLst>
+              <a:ext uri="{FF2B5EF4-FFF2-40B4-BE49-F238E27FC236}">
+                <a16:creationId xmlns:a16="http://schemas.microsoft.com/office/drawing/2014/main" id="{C4B466CD-4D27-4E90-DF03-BDCD6CB1511E}"/>
+              </a:ext>
+            </a:extLst>
+          </p:cNvPr>
+          <p:cNvSpPr>
+            <a:spLocks noGrp="1"/>
+          </p:cNvSpPr>
+          <p:nvPr>
+            <p:ph idx="1"/>
+          </p:nvPr>
+        </p:nvSpPr>
+        <p:spPr/>
+        <p:txBody>
+          <a:bodyPr/>
+          <a:lstStyle/>
+          <a:p>
+            <a:r>
+              <a:rPr lang="en-US" dirty="0"/>
+              <a:t>As we’ve seen, we are able to implement linear structures in a number of different ways</a:t>
+            </a:r>
+          </a:p>
+          <a:p>
+            <a:r>
+              <a:rPr lang="en-US" dirty="0"/>
+              <a:t>Specifically there are two we can focus on</a:t>
+            </a:r>
+          </a:p>
+          <a:p>
+            <a:pPr marL="514350" lvl="1" indent="-285750">
+              <a:buFont typeface="Arial" panose="020B0604020202020204" pitchFamily="34" charset="0"/>
+              <a:buChar char="•"/>
+            </a:pPr>
+            <a:r>
+              <a:rPr lang="en-US" i="0" dirty="0"/>
+              <a:t>Arrays</a:t>
+            </a:r>
+          </a:p>
+        </p:txBody>
+      </p:sp>
+    </p:spTree>
+    <p:extLst>
+      <p:ext uri="{BB962C8B-B14F-4D97-AF65-F5344CB8AC3E}">
+        <p14:creationId xmlns:p14="http://schemas.microsoft.com/office/powerpoint/2010/main" val="3847427464"/>
+      </p:ext>
+    </p:extLst>
+  </p:cSld>
+  <p:clrMapOvr>
+    <a:masterClrMapping/>
+  </p:clrMapOvr>
+</p:sld>
+</file>
+
+<file path=ppt/slides/slide16.xml><?xml version="1.0" encoding="utf-8"?>
+<p:sld xmlns:a="http://schemas.openxmlformats.org/drawingml/2006/main" xmlns:r="http://schemas.openxmlformats.org/officeDocument/2006/relationships" xmlns:p="http://schemas.openxmlformats.org/presentationml/2006/main">
+  <p:cSld>
+    <p:spTree>
+      <p:nvGrpSpPr>
+        <p:cNvPr id="1" name="">
+          <a:extLst>
+            <a:ext uri="{FF2B5EF4-FFF2-40B4-BE49-F238E27FC236}">
+              <a16:creationId xmlns:a16="http://schemas.microsoft.com/office/drawing/2014/main" id="{A1992A0F-C762-B6D6-14AE-24A8174F8D59}"/>
+            </a:ext>
+          </a:extLst>
+        </p:cNvPr>
+        <p:cNvGrpSpPr/>
+        <p:nvPr/>
+      </p:nvGrpSpPr>
+      <p:grpSpPr>
+        <a:xfrm>
+          <a:off x="0" y="0"/>
+          <a:ext cx="0" cy="0"/>
+          <a:chOff x="0" y="0"/>
+          <a:chExt cx="0" cy="0"/>
+        </a:xfrm>
+      </p:grpSpPr>
+      <p:sp>
+        <p:nvSpPr>
+          <p:cNvPr id="2" name="Title 1">
+            <a:extLst>
+              <a:ext uri="{FF2B5EF4-FFF2-40B4-BE49-F238E27FC236}">
+                <a16:creationId xmlns:a16="http://schemas.microsoft.com/office/drawing/2014/main" id="{3FA64C3D-122D-F7FA-168A-960E76E29B1F}"/>
+              </a:ext>
+            </a:extLst>
+          </p:cNvPr>
+          <p:cNvSpPr>
+            <a:spLocks noGrp="1"/>
+          </p:cNvSpPr>
+          <p:nvPr>
+            <p:ph type="title"/>
+          </p:nvPr>
+        </p:nvSpPr>
+        <p:spPr/>
+        <p:txBody>
+          <a:bodyPr/>
+          <a:lstStyle/>
+          <a:p>
+            <a:r>
+              <a:rPr lang="en-US" dirty="0"/>
+              <a:t>Linear Structure Implementation</a:t>
+            </a:r>
+          </a:p>
+        </p:txBody>
+      </p:sp>
+      <p:sp>
+        <p:nvSpPr>
+          <p:cNvPr id="3" name="Content Placeholder 2">
+            <a:extLst>
+              <a:ext uri="{FF2B5EF4-FFF2-40B4-BE49-F238E27FC236}">
+                <a16:creationId xmlns:a16="http://schemas.microsoft.com/office/drawing/2014/main" id="{A6717A6E-D801-BF0E-4692-08B39CC6D530}"/>
+              </a:ext>
+            </a:extLst>
+          </p:cNvPr>
+          <p:cNvSpPr>
+            <a:spLocks noGrp="1"/>
+          </p:cNvSpPr>
+          <p:nvPr>
+            <p:ph idx="1"/>
+          </p:nvPr>
+        </p:nvSpPr>
+        <p:spPr/>
+        <p:txBody>
+          <a:bodyPr/>
+          <a:lstStyle/>
+          <a:p>
+            <a:r>
+              <a:rPr lang="en-US" dirty="0"/>
+              <a:t>As we’ve seen, we are able to implement linear structures in a number of different ways</a:t>
+            </a:r>
+          </a:p>
+          <a:p>
+            <a:r>
+              <a:rPr lang="en-US" dirty="0"/>
+              <a:t>Specifically there are two we can focus on</a:t>
+            </a:r>
+          </a:p>
+          <a:p>
+            <a:pPr marL="514350" lvl="1" indent="-285750">
+              <a:buFont typeface="Arial" panose="020B0604020202020204" pitchFamily="34" charset="0"/>
+              <a:buChar char="•"/>
+            </a:pPr>
+            <a:r>
+              <a:rPr lang="en-US" i="0" dirty="0"/>
+              <a:t>Arrays</a:t>
+            </a:r>
+          </a:p>
+          <a:p>
+            <a:pPr marL="514350" lvl="1" indent="-285750">
+              <a:buFont typeface="Arial" panose="020B0604020202020204" pitchFamily="34" charset="0"/>
+              <a:buChar char="•"/>
+            </a:pPr>
+            <a:r>
+              <a:rPr lang="en-US" i="0" dirty="0"/>
+              <a:t>Linked List</a:t>
+            </a:r>
+          </a:p>
+        </p:txBody>
+      </p:sp>
+    </p:spTree>
+    <p:extLst>
+      <p:ext uri="{BB962C8B-B14F-4D97-AF65-F5344CB8AC3E}">
+        <p14:creationId xmlns:p14="http://schemas.microsoft.com/office/powerpoint/2010/main" val="2328636776"/>
+      </p:ext>
+    </p:extLst>
+  </p:cSld>
+  <p:clrMapOvr>
+    <a:masterClrMapping/>
+  </p:clrMapOvr>
+</p:sld>
+</file>
+
+<file path=ppt/slides/slide17.xml><?xml version="1.0" encoding="utf-8"?>
+<p:sld xmlns:a="http://schemas.openxmlformats.org/drawingml/2006/main" xmlns:r="http://schemas.openxmlformats.org/officeDocument/2006/relationships" xmlns:p="http://schemas.openxmlformats.org/presentationml/2006/main">
+  <p:cSld>
+    <p:spTree>
+      <p:nvGrpSpPr>
+        <p:cNvPr id="1" name=""/>
+        <p:cNvGrpSpPr/>
+        <p:nvPr/>
+      </p:nvGrpSpPr>
+      <p:grpSpPr>
+        <a:xfrm>
+          <a:off x="0" y="0"/>
+          <a:ext cx="0" cy="0"/>
+          <a:chOff x="0" y="0"/>
+          <a:chExt cx="0" cy="0"/>
+        </a:xfrm>
+      </p:grpSpPr>
+      <p:sp>
+        <p:nvSpPr>
+          <p:cNvPr id="2" name="Title 1">
+            <a:extLst>
+              <a:ext uri="{FF2B5EF4-FFF2-40B4-BE49-F238E27FC236}">
                 <a16:creationId xmlns:a16="http://schemas.microsoft.com/office/drawing/2014/main" id="{EDD8596E-DA0B-DB96-7D07-0C010CBDB4B7}"/>
               </a:ext>
             </a:extLst>
@@ -4481,7 +5376,7 @@
 </p:sld>
 </file>
 
-<file path=ppt/slides/slide12.xml><?xml version="1.0" encoding="utf-8"?>
+<file path=ppt/slides/slide18.xml><?xml version="1.0" encoding="utf-8"?>
 <p:sld xmlns:a="http://schemas.openxmlformats.org/drawingml/2006/main" xmlns:r="http://schemas.openxmlformats.org/officeDocument/2006/relationships" xmlns:p="http://schemas.openxmlformats.org/presentationml/2006/main">
   <p:cSld>
     <p:spTree>
@@ -4616,7 +5511,7 @@
           <p:cNvPr id="2" name="Title 1">
             <a:extLst>
               <a:ext uri="{FF2B5EF4-FFF2-40B4-BE49-F238E27FC236}">
-                <a16:creationId xmlns:a16="http://schemas.microsoft.com/office/drawing/2014/main" id="{D5315B04-24AA-4BF9-BB6B-5CA80D8ED008}"/>
+                <a16:creationId xmlns:a16="http://schemas.microsoft.com/office/drawing/2014/main" id="{3F70BECD-2BC9-D370-8668-1FC6116E4677}"/>
               </a:ext>
             </a:extLst>
           </p:cNvPr>
@@ -4634,25 +5529,25 @@
           <a:p>
             <a:r>
               <a:rPr lang="en-US" dirty="0"/>
-              <a:t>Linear Structures</a:t>
-            </a:r>
-          </a:p>
-        </p:txBody>
-      </p:sp>
-      <p:sp>
-        <p:nvSpPr>
-          <p:cNvPr id="3" name="Text Placeholder 2">
-            <a:extLst>
-              <a:ext uri="{FF2B5EF4-FFF2-40B4-BE49-F238E27FC236}">
-                <a16:creationId xmlns:a16="http://schemas.microsoft.com/office/drawing/2014/main" id="{A778E52B-E8DF-08F9-3760-4399A878FFE3}"/>
-              </a:ext>
-            </a:extLst>
-          </p:cNvPr>
-          <p:cNvSpPr>
-            <a:spLocks noGrp="1"/>
-          </p:cNvSpPr>
-          <p:nvPr>
-            <p:ph type="body" idx="1"/>
+              <a:t>Review</a:t>
+            </a:r>
+          </a:p>
+        </p:txBody>
+      </p:sp>
+      <p:sp>
+        <p:nvSpPr>
+          <p:cNvPr id="3" name="Content Placeholder 2">
+            <a:extLst>
+              <a:ext uri="{FF2B5EF4-FFF2-40B4-BE49-F238E27FC236}">
+                <a16:creationId xmlns:a16="http://schemas.microsoft.com/office/drawing/2014/main" id="{B75D04DF-18FD-2A3F-858C-27DB26B0EA47}"/>
+              </a:ext>
+            </a:extLst>
+          </p:cNvPr>
+          <p:cNvSpPr>
+            <a:spLocks noGrp="1"/>
+          </p:cNvSpPr>
+          <p:nvPr>
+            <p:ph idx="1"/>
           </p:nvPr>
         </p:nvSpPr>
         <p:spPr/>
@@ -4660,14 +5555,81 @@
           <a:bodyPr/>
           <a:lstStyle/>
           <a:p>
-            <a:endParaRPr lang="en-US"/>
+            <a:r>
+              <a:rPr lang="en-US" dirty="0"/>
+              <a:t>Abstract Data Type (ADT)</a:t>
+            </a:r>
+          </a:p>
+          <a:p>
+            <a:pPr marL="514350" lvl="1" indent="-285750">
+              <a:buFont typeface="Arial" panose="020B0604020202020204" pitchFamily="34" charset="0"/>
+              <a:buChar char="•"/>
+            </a:pPr>
+            <a:r>
+              <a:rPr lang="en-US" i="0" dirty="0"/>
+              <a:t>A theoretical understanding of how we want to organize and work with our data</a:t>
+            </a:r>
+          </a:p>
+          <a:p>
+            <a:pPr marL="514350" lvl="1" indent="-285750">
+              <a:buFont typeface="Arial" panose="020B0604020202020204" pitchFamily="34" charset="0"/>
+              <a:buChar char="•"/>
+            </a:pPr>
+            <a:r>
+              <a:rPr lang="en-US" i="0" dirty="0"/>
+              <a:t>The interface of the ADT is defined in terms of a type and a set of operations</a:t>
+            </a:r>
+          </a:p>
+          <a:p>
+            <a:pPr marL="514350" lvl="1" indent="-285750">
+              <a:buFont typeface="Arial" panose="020B0604020202020204" pitchFamily="34" charset="0"/>
+              <a:buChar char="•"/>
+            </a:pPr>
+            <a:r>
+              <a:rPr lang="en-US" i="0" dirty="0"/>
+              <a:t>The ADT does </a:t>
+            </a:r>
+            <a:r>
+              <a:rPr lang="en-US" dirty="0"/>
+              <a:t>not</a:t>
+            </a:r>
+            <a:r>
+              <a:rPr lang="en-US" i="0" dirty="0"/>
+              <a:t> specify how the data type is implemented</a:t>
+            </a:r>
+          </a:p>
+          <a:p>
+            <a:r>
+              <a:rPr lang="en-US" dirty="0"/>
+              <a:t>Data Structure</a:t>
+            </a:r>
+          </a:p>
+          <a:p>
+            <a:pPr marL="514350" lvl="1" indent="-285750">
+              <a:buFont typeface="Arial" panose="020B0604020202020204" pitchFamily="34" charset="0"/>
+              <a:buChar char="•"/>
+            </a:pPr>
+            <a:r>
+              <a:rPr lang="en-US" i="0" dirty="0"/>
+              <a:t>The actual implementation of an ADT</a:t>
+            </a:r>
+          </a:p>
+          <a:p>
+            <a:pPr marL="514350" lvl="1" indent="-285750">
+              <a:buFont typeface="Arial" panose="020B0604020202020204" pitchFamily="34" charset="0"/>
+              <a:buChar char="•"/>
+            </a:pPr>
+            <a:r>
+              <a:rPr lang="en-US" i="0" dirty="0"/>
+              <a:t>In OOP, this is a class with member functions and member data</a:t>
+            </a:r>
           </a:p>
         </p:txBody>
       </p:sp>
     </p:spTree>
     <p:extLst>
       <p:ext uri="{BB962C8B-B14F-4D97-AF65-F5344CB8AC3E}">
-        <p14:creationId xmlns:p14="http://schemas.microsoft.com/office/powerpoint/2010/main" val="4273518791"/>
+        <p14:creationId xmlns:p14="http://schemas.microsoft.com/office/powerpoint/2010/main" val="630821676"/>
       </p:ext>
     </p:extLst>
   </p:cSld>
@@ -4699,7 +5661,7 @@
           <p:cNvPr id="2" name="Title 1">
             <a:extLst>
               <a:ext uri="{FF2B5EF4-FFF2-40B4-BE49-F238E27FC236}">
-                <a16:creationId xmlns:a16="http://schemas.microsoft.com/office/drawing/2014/main" id="{C6D78449-5B2D-614B-8CAB-6C3ADBFE9378}"/>
+                <a16:creationId xmlns:a16="http://schemas.microsoft.com/office/drawing/2014/main" id="{D5315B04-24AA-4BF9-BB6B-5CA80D8ED008}"/>
               </a:ext>
             </a:extLst>
           </p:cNvPr>
@@ -4724,18 +5686,18 @@
       </p:sp>
       <p:sp>
         <p:nvSpPr>
-          <p:cNvPr id="3" name="Content Placeholder 2">
-            <a:extLst>
-              <a:ext uri="{FF2B5EF4-FFF2-40B4-BE49-F238E27FC236}">
-                <a16:creationId xmlns:a16="http://schemas.microsoft.com/office/drawing/2014/main" id="{992E9029-D3E0-AF55-19C5-A39A01CEB74E}"/>
-              </a:ext>
-            </a:extLst>
-          </p:cNvPr>
-          <p:cNvSpPr>
-            <a:spLocks noGrp="1"/>
-          </p:cNvSpPr>
-          <p:nvPr>
-            <p:ph idx="1"/>
+          <p:cNvPr id="3" name="Text Placeholder 2">
+            <a:extLst>
+              <a:ext uri="{FF2B5EF4-FFF2-40B4-BE49-F238E27FC236}">
+                <a16:creationId xmlns:a16="http://schemas.microsoft.com/office/drawing/2014/main" id="{A778E52B-E8DF-08F9-3760-4399A878FFE3}"/>
+              </a:ext>
+            </a:extLst>
+          </p:cNvPr>
+          <p:cNvSpPr>
+            <a:spLocks noGrp="1"/>
+          </p:cNvSpPr>
+          <p:nvPr>
+            <p:ph type="body" idx="1"/>
           </p:nvPr>
         </p:nvSpPr>
         <p:spPr/>
@@ -4743,35 +5705,14 @@
           <a:bodyPr/>
           <a:lstStyle/>
           <a:p>
-            <a:r>
-              <a:rPr lang="en-US" dirty="0"/>
-              <a:t>In COMP132 you were introduced to three types of linear structures</a:t>
-            </a:r>
-          </a:p>
-          <a:p>
-            <a:r>
-              <a:rPr lang="en-US" dirty="0"/>
-              <a:t>List</a:t>
-            </a:r>
-          </a:p>
-          <a:p>
-            <a:r>
-              <a:rPr lang="en-US" dirty="0"/>
-              <a:t>Stack</a:t>
-            </a:r>
-          </a:p>
-          <a:p>
-            <a:r>
-              <a:rPr lang="en-US" dirty="0"/>
-              <a:t>Queue</a:t>
-            </a:r>
+            <a:endParaRPr lang="en-US"/>
           </a:p>
         </p:txBody>
       </p:sp>
     </p:spTree>
     <p:extLst>
       <p:ext uri="{BB962C8B-B14F-4D97-AF65-F5344CB8AC3E}">
-        <p14:creationId xmlns:p14="http://schemas.microsoft.com/office/powerpoint/2010/main" val="1156476572"/>
+        <p14:creationId xmlns:p14="http://schemas.microsoft.com/office/powerpoint/2010/main" val="4273518791"/>
       </p:ext>
     </p:extLst>
   </p:cSld>
@@ -4803,6 +5744,110 @@
           <p:cNvPr id="2" name="Title 1">
             <a:extLst>
               <a:ext uri="{FF2B5EF4-FFF2-40B4-BE49-F238E27FC236}">
+                <a16:creationId xmlns:a16="http://schemas.microsoft.com/office/drawing/2014/main" id="{C6D78449-5B2D-614B-8CAB-6C3ADBFE9378}"/>
+              </a:ext>
+            </a:extLst>
+          </p:cNvPr>
+          <p:cNvSpPr>
+            <a:spLocks noGrp="1"/>
+          </p:cNvSpPr>
+          <p:nvPr>
+            <p:ph type="title"/>
+          </p:nvPr>
+        </p:nvSpPr>
+        <p:spPr/>
+        <p:txBody>
+          <a:bodyPr/>
+          <a:lstStyle/>
+          <a:p>
+            <a:r>
+              <a:rPr lang="en-US" dirty="0"/>
+              <a:t>Linear Structures</a:t>
+            </a:r>
+          </a:p>
+        </p:txBody>
+      </p:sp>
+      <p:sp>
+        <p:nvSpPr>
+          <p:cNvPr id="3" name="Content Placeholder 2">
+            <a:extLst>
+              <a:ext uri="{FF2B5EF4-FFF2-40B4-BE49-F238E27FC236}">
+                <a16:creationId xmlns:a16="http://schemas.microsoft.com/office/drawing/2014/main" id="{992E9029-D3E0-AF55-19C5-A39A01CEB74E}"/>
+              </a:ext>
+            </a:extLst>
+          </p:cNvPr>
+          <p:cNvSpPr>
+            <a:spLocks noGrp="1"/>
+          </p:cNvSpPr>
+          <p:nvPr>
+            <p:ph idx="1"/>
+          </p:nvPr>
+        </p:nvSpPr>
+        <p:spPr/>
+        <p:txBody>
+          <a:bodyPr/>
+          <a:lstStyle/>
+          <a:p>
+            <a:r>
+              <a:rPr lang="en-US" dirty="0"/>
+              <a:t>In COMP132 you were introduced to three types of linear structures</a:t>
+            </a:r>
+          </a:p>
+          <a:p>
+            <a:r>
+              <a:rPr lang="en-US" dirty="0"/>
+              <a:t>List</a:t>
+            </a:r>
+          </a:p>
+          <a:p>
+            <a:r>
+              <a:rPr lang="en-US" dirty="0"/>
+              <a:t>Stack</a:t>
+            </a:r>
+          </a:p>
+          <a:p>
+            <a:r>
+              <a:rPr lang="en-US" dirty="0"/>
+              <a:t>Queue</a:t>
+            </a:r>
+          </a:p>
+        </p:txBody>
+      </p:sp>
+    </p:spTree>
+    <p:extLst>
+      <p:ext uri="{BB962C8B-B14F-4D97-AF65-F5344CB8AC3E}">
+        <p14:creationId xmlns:p14="http://schemas.microsoft.com/office/powerpoint/2010/main" val="1156476572"/>
+      </p:ext>
+    </p:extLst>
+  </p:cSld>
+  <p:clrMapOvr>
+    <a:masterClrMapping/>
+  </p:clrMapOvr>
+</p:sld>
+</file>
+
+<file path=ppt/slides/slide5.xml><?xml version="1.0" encoding="utf-8"?>
+<p:sld xmlns:a="http://schemas.openxmlformats.org/drawingml/2006/main" xmlns:r="http://schemas.openxmlformats.org/officeDocument/2006/relationships" xmlns:p="http://schemas.openxmlformats.org/presentationml/2006/main">
+  <p:cSld>
+    <p:spTree>
+      <p:nvGrpSpPr>
+        <p:cNvPr id="1" name=""/>
+        <p:cNvGrpSpPr/>
+        <p:nvPr/>
+      </p:nvGrpSpPr>
+      <p:grpSpPr>
+        <a:xfrm>
+          <a:off x="0" y="0"/>
+          <a:ext cx="0" cy="0"/>
+          <a:chOff x="0" y="0"/>
+          <a:chExt cx="0" cy="0"/>
+        </a:xfrm>
+      </p:grpSpPr>
+      <p:sp>
+        <p:nvSpPr>
+          <p:cNvPr id="2" name="Title 1">
+            <a:extLst>
+              <a:ext uri="{FF2B5EF4-FFF2-40B4-BE49-F238E27FC236}">
                 <a16:creationId xmlns:a16="http://schemas.microsoft.com/office/drawing/2014/main" id="{BE06E88A-D5CE-A886-30E5-D9298F8C9650}"/>
               </a:ext>
             </a:extLst>
@@ -4822,96 +5867,6 @@
             <a:r>
               <a:rPr lang="en-US" dirty="0"/>
               <a:t>List ADT</a:t>
-            </a:r>
-          </a:p>
-        </p:txBody>
-      </p:sp>
-      <p:sp>
-        <p:nvSpPr>
-          <p:cNvPr id="3" name="Content Placeholder 2">
-            <a:extLst>
-              <a:ext uri="{FF2B5EF4-FFF2-40B4-BE49-F238E27FC236}">
-                <a16:creationId xmlns:a16="http://schemas.microsoft.com/office/drawing/2014/main" id="{05854261-A3E9-0D17-D5FE-2AB910105781}"/>
-              </a:ext>
-            </a:extLst>
-          </p:cNvPr>
-          <p:cNvSpPr>
-            <a:spLocks noGrp="1"/>
-          </p:cNvSpPr>
-          <p:nvPr>
-            <p:ph sz="half" idx="1"/>
-          </p:nvPr>
-        </p:nvSpPr>
-        <p:spPr>
-          <a:xfrm>
-            <a:off x="2141483" y="2922069"/>
-            <a:ext cx="4798979" cy="2461098"/>
-          </a:xfrm>
-        </p:spPr>
-        <p:txBody>
-          <a:bodyPr/>
-          <a:lstStyle/>
-          <a:p>
-            <a:r>
-              <a:rPr lang="en-US" dirty="0"/>
-              <a:t>size</a:t>
-            </a:r>
-          </a:p>
-          <a:p>
-            <a:r>
-              <a:rPr lang="en-US" dirty="0"/>
-              <a:t>get</a:t>
-            </a:r>
-          </a:p>
-          <a:p>
-            <a:r>
-              <a:rPr lang="en-US" dirty="0"/>
-              <a:t>set</a:t>
-            </a:r>
-          </a:p>
-        </p:txBody>
-      </p:sp>
-      <p:sp>
-        <p:nvSpPr>
-          <p:cNvPr id="4" name="Content Placeholder 3">
-            <a:extLst>
-              <a:ext uri="{FF2B5EF4-FFF2-40B4-BE49-F238E27FC236}">
-                <a16:creationId xmlns:a16="http://schemas.microsoft.com/office/drawing/2014/main" id="{9F4C8D1F-BA79-683E-5DE4-624CF0443A7D}"/>
-              </a:ext>
-            </a:extLst>
-          </p:cNvPr>
-          <p:cNvSpPr>
-            <a:spLocks noGrp="1"/>
-          </p:cNvSpPr>
-          <p:nvPr>
-            <p:ph sz="half" idx="2"/>
-          </p:nvPr>
-        </p:nvSpPr>
-        <p:spPr>
-          <a:xfrm>
-            <a:off x="3391206" y="2922069"/>
-            <a:ext cx="4798980" cy="2461098"/>
-          </a:xfrm>
-        </p:spPr>
-        <p:txBody>
-          <a:bodyPr/>
-          <a:lstStyle/>
-          <a:p>
-            <a:r>
-              <a:rPr lang="en-US" dirty="0"/>
-              <a:t>add</a:t>
-            </a:r>
-          </a:p>
-          <a:p>
-            <a:r>
-              <a:rPr lang="en-US" dirty="0"/>
-              <a:t>remove</a:t>
-            </a:r>
-          </a:p>
-          <a:p>
-            <a:r>
-              <a:rPr lang="en-US" dirty="0"/>
-              <a:t>insert</a:t>
             </a:r>
           </a:p>
         </p:txBody>
@@ -4984,7 +5939,216 @@
 </p:sld>
 </file>
 
-<file path=ppt/slides/slide5.xml><?xml version="1.0" encoding="utf-8"?>
+<file path=ppt/slides/slide6.xml><?xml version="1.0" encoding="utf-8"?>
+<p:sld xmlns:a="http://schemas.openxmlformats.org/drawingml/2006/main" xmlns:r="http://schemas.openxmlformats.org/officeDocument/2006/relationships" xmlns:p="http://schemas.openxmlformats.org/presentationml/2006/main">
+  <p:cSld>
+    <p:spTree>
+      <p:nvGrpSpPr>
+        <p:cNvPr id="1" name="">
+          <a:extLst>
+            <a:ext uri="{FF2B5EF4-FFF2-40B4-BE49-F238E27FC236}">
+              <a16:creationId xmlns:a16="http://schemas.microsoft.com/office/drawing/2014/main" id="{7D1C286C-BAD9-C867-5B44-0EAE4AB39F9B}"/>
+            </a:ext>
+          </a:extLst>
+        </p:cNvPr>
+        <p:cNvGrpSpPr/>
+        <p:nvPr/>
+      </p:nvGrpSpPr>
+      <p:grpSpPr>
+        <a:xfrm>
+          <a:off x="0" y="0"/>
+          <a:ext cx="0" cy="0"/>
+          <a:chOff x="0" y="0"/>
+          <a:chExt cx="0" cy="0"/>
+        </a:xfrm>
+      </p:grpSpPr>
+      <p:sp>
+        <p:nvSpPr>
+          <p:cNvPr id="2" name="Title 1">
+            <a:extLst>
+              <a:ext uri="{FF2B5EF4-FFF2-40B4-BE49-F238E27FC236}">
+                <a16:creationId xmlns:a16="http://schemas.microsoft.com/office/drawing/2014/main" id="{7F44CCD0-55EC-7D68-44BF-FEC09C25D649}"/>
+              </a:ext>
+            </a:extLst>
+          </p:cNvPr>
+          <p:cNvSpPr>
+            <a:spLocks noGrp="1"/>
+          </p:cNvSpPr>
+          <p:nvPr>
+            <p:ph type="title"/>
+          </p:nvPr>
+        </p:nvSpPr>
+        <p:spPr/>
+        <p:txBody>
+          <a:bodyPr/>
+          <a:lstStyle/>
+          <a:p>
+            <a:r>
+              <a:rPr lang="en-US" dirty="0"/>
+              <a:t>List ADT</a:t>
+            </a:r>
+          </a:p>
+        </p:txBody>
+      </p:sp>
+      <p:sp>
+        <p:nvSpPr>
+          <p:cNvPr id="3" name="Content Placeholder 2">
+            <a:extLst>
+              <a:ext uri="{FF2B5EF4-FFF2-40B4-BE49-F238E27FC236}">
+                <a16:creationId xmlns:a16="http://schemas.microsoft.com/office/drawing/2014/main" id="{4B9CB897-B107-C713-4849-E6B807D5BB28}"/>
+              </a:ext>
+            </a:extLst>
+          </p:cNvPr>
+          <p:cNvSpPr>
+            <a:spLocks noGrp="1"/>
+          </p:cNvSpPr>
+          <p:nvPr>
+            <p:ph sz="half" idx="1"/>
+          </p:nvPr>
+        </p:nvSpPr>
+        <p:spPr>
+          <a:xfrm>
+            <a:off x="2141483" y="2922069"/>
+            <a:ext cx="4798979" cy="2461098"/>
+          </a:xfrm>
+        </p:spPr>
+        <p:txBody>
+          <a:bodyPr/>
+          <a:lstStyle/>
+          <a:p>
+            <a:r>
+              <a:rPr lang="en-US" dirty="0"/>
+              <a:t>size</a:t>
+            </a:r>
+          </a:p>
+          <a:p>
+            <a:r>
+              <a:rPr lang="en-US" dirty="0"/>
+              <a:t>get</a:t>
+            </a:r>
+          </a:p>
+          <a:p>
+            <a:r>
+              <a:rPr lang="en-US" dirty="0"/>
+              <a:t>set</a:t>
+            </a:r>
+          </a:p>
+        </p:txBody>
+      </p:sp>
+      <p:sp>
+        <p:nvSpPr>
+          <p:cNvPr id="4" name="Content Placeholder 3">
+            <a:extLst>
+              <a:ext uri="{FF2B5EF4-FFF2-40B4-BE49-F238E27FC236}">
+                <a16:creationId xmlns:a16="http://schemas.microsoft.com/office/drawing/2014/main" id="{FAC7868F-F5BD-B43A-91A3-4685F4DC732B}"/>
+              </a:ext>
+            </a:extLst>
+          </p:cNvPr>
+          <p:cNvSpPr>
+            <a:spLocks noGrp="1"/>
+          </p:cNvSpPr>
+          <p:nvPr>
+            <p:ph sz="half" idx="2"/>
+          </p:nvPr>
+        </p:nvSpPr>
+        <p:spPr>
+          <a:xfrm>
+            <a:off x="3391206" y="2922069"/>
+            <a:ext cx="4798980" cy="2461098"/>
+          </a:xfrm>
+        </p:spPr>
+        <p:txBody>
+          <a:bodyPr/>
+          <a:lstStyle/>
+          <a:p>
+            <a:r>
+              <a:rPr lang="en-US" dirty="0"/>
+              <a:t>add</a:t>
+            </a:r>
+          </a:p>
+          <a:p>
+            <a:r>
+              <a:rPr lang="en-US" dirty="0"/>
+              <a:t>remove</a:t>
+            </a:r>
+          </a:p>
+          <a:p>
+            <a:r>
+              <a:rPr lang="en-US" dirty="0"/>
+              <a:t>insert</a:t>
+            </a:r>
+          </a:p>
+        </p:txBody>
+      </p:sp>
+      <p:sp>
+        <p:nvSpPr>
+          <p:cNvPr id="5" name="TextBox 4">
+            <a:extLst>
+              <a:ext uri="{FF2B5EF4-FFF2-40B4-BE49-F238E27FC236}">
+                <a16:creationId xmlns:a16="http://schemas.microsoft.com/office/drawing/2014/main" id="{A037F1F8-EBA4-7FD6-F8AE-67D8F2BBBF24}"/>
+              </a:ext>
+            </a:extLst>
+          </p:cNvPr>
+          <p:cNvSpPr txBox="1"/>
+          <p:nvPr/>
+        </p:nvSpPr>
+        <p:spPr>
+          <a:xfrm>
+            <a:off x="1143000" y="2039007"/>
+            <a:ext cx="9879724" cy="883062"/>
+          </a:xfrm>
+          <a:prstGeom prst="rect">
+            <a:avLst/>
+          </a:prstGeom>
+          <a:noFill/>
+        </p:spPr>
+        <p:txBody>
+          <a:bodyPr wrap="square" rtlCol="0">
+            <a:spAutoFit/>
+          </a:bodyPr>
+          <a:lstStyle/>
+          <a:p>
+            <a:pPr marL="285750" indent="-285750">
+              <a:lnSpc>
+                <a:spcPct val="150000"/>
+              </a:lnSpc>
+              <a:buFont typeface="Arial" panose="020B0604020202020204" pitchFamily="34" charset="0"/>
+              <a:buChar char="•"/>
+            </a:pPr>
+            <a:r>
+              <a:rPr lang="en-US" dirty="0"/>
+              <a:t>A list is an ordered collection of object</a:t>
+            </a:r>
+          </a:p>
+          <a:p>
+            <a:pPr marL="285750" indent="-285750">
+              <a:lnSpc>
+                <a:spcPct val="150000"/>
+              </a:lnSpc>
+              <a:buFont typeface="Arial" panose="020B0604020202020204" pitchFamily="34" charset="0"/>
+              <a:buChar char="•"/>
+            </a:pPr>
+            <a:r>
+              <a:rPr lang="en-US" dirty="0"/>
+              <a:t>With each implementation there are six basic operations </a:t>
+            </a:r>
+          </a:p>
+        </p:txBody>
+      </p:sp>
+    </p:spTree>
+    <p:extLst>
+      <p:ext uri="{BB962C8B-B14F-4D97-AF65-F5344CB8AC3E}">
+        <p14:creationId xmlns:p14="http://schemas.microsoft.com/office/powerpoint/2010/main" val="1485857782"/>
+      </p:ext>
+    </p:extLst>
+  </p:cSld>
+  <p:clrMapOvr>
+    <a:masterClrMapping/>
+  </p:clrMapOvr>
+</p:sld>
+</file>
+
+<file path=ppt/slides/slide7.xml><?xml version="1.0" encoding="utf-8"?>
 <p:sld xmlns:a="http://schemas.openxmlformats.org/drawingml/2006/main" xmlns:r="http://schemas.openxmlformats.org/officeDocument/2006/relationships" xmlns:p="http://schemas.openxmlformats.org/presentationml/2006/main">
   <p:cSld>
     <p:spTree>
@@ -5201,7 +6365,7 @@
 </p:sld>
 </file>
 
-<file path=ppt/slides/slide6.xml><?xml version="1.0" encoding="utf-8"?>
+<file path=ppt/slides/slide8.xml><?xml version="1.0" encoding="utf-8"?>
 <p:sld xmlns:a="http://schemas.openxmlformats.org/drawingml/2006/main" xmlns:r="http://schemas.openxmlformats.org/officeDocument/2006/relationships" xmlns:p="http://schemas.openxmlformats.org/presentationml/2006/main">
   <p:cSld>
     <p:spTree>
@@ -5254,90 +6418,6 @@
       </p:sp>
       <p:sp>
         <p:nvSpPr>
-          <p:cNvPr id="3" name="Content Placeholder 2">
-            <a:extLst>
-              <a:ext uri="{FF2B5EF4-FFF2-40B4-BE49-F238E27FC236}">
-                <a16:creationId xmlns:a16="http://schemas.microsoft.com/office/drawing/2014/main" id="{CF32BC79-F1E9-30CB-8748-DC8B10155795}"/>
-              </a:ext>
-            </a:extLst>
-          </p:cNvPr>
-          <p:cNvSpPr>
-            <a:spLocks noGrp="1"/>
-          </p:cNvSpPr>
-          <p:nvPr>
-            <p:ph sz="half" idx="1"/>
-          </p:nvPr>
-        </p:nvSpPr>
-        <p:spPr>
-          <a:xfrm>
-            <a:off x="1721072" y="3429000"/>
-            <a:ext cx="4798979" cy="2461098"/>
-          </a:xfrm>
-        </p:spPr>
-        <p:txBody>
-          <a:bodyPr/>
-          <a:lstStyle/>
-          <a:p>
-            <a:r>
-              <a:rPr lang="en-US" dirty="0"/>
-              <a:t>size</a:t>
-            </a:r>
-          </a:p>
-          <a:p>
-            <a:r>
-              <a:rPr lang="en-US" dirty="0"/>
-              <a:t>push</a:t>
-            </a:r>
-          </a:p>
-        </p:txBody>
-      </p:sp>
-      <p:sp>
-        <p:nvSpPr>
-          <p:cNvPr id="4" name="Content Placeholder 3">
-            <a:extLst>
-              <a:ext uri="{FF2B5EF4-FFF2-40B4-BE49-F238E27FC236}">
-                <a16:creationId xmlns:a16="http://schemas.microsoft.com/office/drawing/2014/main" id="{B194EDC5-0D87-76AB-2BAD-3D75BF83D017}"/>
-              </a:ext>
-            </a:extLst>
-          </p:cNvPr>
-          <p:cNvSpPr>
-            <a:spLocks noGrp="1"/>
-          </p:cNvSpPr>
-          <p:nvPr>
-            <p:ph sz="half" idx="2"/>
-          </p:nvPr>
-        </p:nvSpPr>
-        <p:spPr>
-          <a:xfrm>
-            <a:off x="3107427" y="3399905"/>
-            <a:ext cx="4798980" cy="2461098"/>
-          </a:xfrm>
-        </p:spPr>
-        <p:txBody>
-          <a:bodyPr/>
-          <a:lstStyle/>
-          <a:p>
-            <a:r>
-              <a:rPr lang="en-US" dirty="0"/>
-              <a:t>pop</a:t>
-            </a:r>
-          </a:p>
-          <a:p>
-            <a:r>
-              <a:rPr lang="en-US" dirty="0"/>
-              <a:t>peek</a:t>
-            </a:r>
-          </a:p>
-          <a:p>
-            <a:pPr marL="0" indent="0">
-              <a:buNone/>
-            </a:pPr>
-            <a:endParaRPr lang="en-US" dirty="0"/>
-          </a:p>
-        </p:txBody>
-      </p:sp>
-      <p:sp>
-        <p:nvSpPr>
           <p:cNvPr id="5" name="TextBox 4">
             <a:extLst>
               <a:ext uri="{FF2B5EF4-FFF2-40B4-BE49-F238E27FC236}">
@@ -5417,172 +6497,7 @@
 </p:sld>
 </file>
 
-<file path=ppt/slides/slide7.xml><?xml version="1.0" encoding="utf-8"?>
-<p:sld xmlns:a="http://schemas.openxmlformats.org/drawingml/2006/main" xmlns:r="http://schemas.openxmlformats.org/officeDocument/2006/relationships" xmlns:p="http://schemas.openxmlformats.org/presentationml/2006/main">
-  <p:cSld>
-    <p:spTree>
-      <p:nvGrpSpPr>
-        <p:cNvPr id="1" name=""/>
-        <p:cNvGrpSpPr/>
-        <p:nvPr/>
-      </p:nvGrpSpPr>
-      <p:grpSpPr>
-        <a:xfrm>
-          <a:off x="0" y="0"/>
-          <a:ext cx="0" cy="0"/>
-          <a:chOff x="0" y="0"/>
-          <a:chExt cx="0" cy="0"/>
-        </a:xfrm>
-      </p:grpSpPr>
-      <p:sp>
-        <p:nvSpPr>
-          <p:cNvPr id="2" name="Title 1">
-            <a:extLst>
-              <a:ext uri="{FF2B5EF4-FFF2-40B4-BE49-F238E27FC236}">
-                <a16:creationId xmlns:a16="http://schemas.microsoft.com/office/drawing/2014/main" id="{417C1DF7-6061-3C3F-08C8-DFF124A3F3F7}"/>
-              </a:ext>
-            </a:extLst>
-          </p:cNvPr>
-          <p:cNvSpPr>
-            <a:spLocks noGrp="1"/>
-          </p:cNvSpPr>
-          <p:nvPr>
-            <p:ph type="title"/>
-          </p:nvPr>
-        </p:nvSpPr>
-        <p:spPr/>
-        <p:txBody>
-          <a:bodyPr/>
-          <a:lstStyle/>
-          <a:p>
-            <a:r>
-              <a:rPr lang="en-US" dirty="0"/>
-              <a:t>Stack Implementation</a:t>
-            </a:r>
-          </a:p>
-        </p:txBody>
-      </p:sp>
-      <p:sp>
-        <p:nvSpPr>
-          <p:cNvPr id="3" name="Content Placeholder 2">
-            <a:extLst>
-              <a:ext uri="{FF2B5EF4-FFF2-40B4-BE49-F238E27FC236}">
-                <a16:creationId xmlns:a16="http://schemas.microsoft.com/office/drawing/2014/main" id="{C19B6685-11F3-A342-C9C5-E513E8629675}"/>
-              </a:ext>
-            </a:extLst>
-          </p:cNvPr>
-          <p:cNvSpPr>
-            <a:spLocks noGrp="1"/>
-          </p:cNvSpPr>
-          <p:nvPr>
-            <p:ph idx="1"/>
-          </p:nvPr>
-        </p:nvSpPr>
-        <p:spPr/>
-        <p:txBody>
-          <a:bodyPr/>
-          <a:lstStyle/>
-          <a:p>
-            <a:endParaRPr lang="en-US"/>
-          </a:p>
-        </p:txBody>
-      </p:sp>
-      <p:pic>
-        <p:nvPicPr>
-          <p:cNvPr id="4" name="Picture 3">
-            <a:extLst>
-              <a:ext uri="{FF2B5EF4-FFF2-40B4-BE49-F238E27FC236}">
-                <a16:creationId xmlns:a16="http://schemas.microsoft.com/office/drawing/2014/main" id="{380967C0-3EE1-AA7A-9E72-4C23F93FAE02}"/>
-              </a:ext>
-            </a:extLst>
-          </p:cNvPr>
-          <p:cNvPicPr>
-            <a:picLocks noChangeAspect="1"/>
-          </p:cNvPicPr>
-          <p:nvPr/>
-        </p:nvPicPr>
-        <p:blipFill>
-          <a:blip r:embed="rId2"/>
-          <a:stretch>
-            <a:fillRect/>
-          </a:stretch>
-        </p:blipFill>
-        <p:spPr>
-          <a:xfrm>
-            <a:off x="1142999" y="2660650"/>
-            <a:ext cx="9905999" cy="2431290"/>
-          </a:xfrm>
-          <a:prstGeom prst="rect">
-            <a:avLst/>
-          </a:prstGeom>
-        </p:spPr>
-      </p:pic>
-      <p:sp>
-        <p:nvSpPr>
-          <p:cNvPr id="5" name="Rectangle 4">
-            <a:extLst>
-              <a:ext uri="{FF2B5EF4-FFF2-40B4-BE49-F238E27FC236}">
-                <a16:creationId xmlns:a16="http://schemas.microsoft.com/office/drawing/2014/main" id="{7FA8BC4A-332A-99D9-285E-8CFFAB11A40A}"/>
-              </a:ext>
-            </a:extLst>
-          </p:cNvPr>
-          <p:cNvSpPr/>
-          <p:nvPr/>
-        </p:nvSpPr>
-        <p:spPr>
-          <a:xfrm>
-            <a:off x="5602671" y="4717831"/>
-            <a:ext cx="767255" cy="241738"/>
-          </a:xfrm>
-          <a:prstGeom prst="rect">
-            <a:avLst/>
-          </a:prstGeom>
-          <a:noFill/>
-          <a:ln>
-            <a:solidFill>
-              <a:srgbClr val="FF0000"/>
-            </a:solidFill>
-          </a:ln>
-        </p:spPr>
-        <p:style>
-          <a:lnRef idx="2">
-            <a:schemeClr val="accent1">
-              <a:shade val="15000"/>
-            </a:schemeClr>
-          </a:lnRef>
-          <a:fillRef idx="1">
-            <a:schemeClr val="accent1"/>
-          </a:fillRef>
-          <a:effectRef idx="0">
-            <a:schemeClr val="accent1"/>
-          </a:effectRef>
-          <a:fontRef idx="minor">
-            <a:schemeClr val="lt1"/>
-          </a:fontRef>
-        </p:style>
-        <p:txBody>
-          <a:bodyPr rtlCol="0" anchor="ctr"/>
-          <a:lstStyle/>
-          <a:p>
-            <a:pPr algn="ctr"/>
-            <a:endParaRPr lang="en-US"/>
-          </a:p>
-        </p:txBody>
-      </p:sp>
-    </p:spTree>
-    <p:extLst>
-      <p:ext uri="{BB962C8B-B14F-4D97-AF65-F5344CB8AC3E}">
-        <p14:creationId xmlns:p14="http://schemas.microsoft.com/office/powerpoint/2010/main" val="3255628329"/>
-      </p:ext>
-    </p:extLst>
-  </p:cSld>
-  <p:clrMapOvr>
-    <a:masterClrMapping/>
-  </p:clrMapOvr>
-</p:sld>
-</file>
-
-<file path=ppt/slides/slide8.xml><?xml version="1.0" encoding="utf-8"?>
+<file path=ppt/slides/slide9.xml><?xml version="1.0" encoding="utf-8"?>
 <p:sld xmlns:a="http://schemas.openxmlformats.org/drawingml/2006/main" xmlns:r="http://schemas.openxmlformats.org/officeDocument/2006/relationships" xmlns:p="http://schemas.openxmlformats.org/presentationml/2006/main">
   <p:cSld>
     <p:spTree>
@@ -5590,7 +6505,7 @@
         <p:cNvPr id="1" name="">
           <a:extLst>
             <a:ext uri="{FF2B5EF4-FFF2-40B4-BE49-F238E27FC236}">
-              <a16:creationId xmlns:a16="http://schemas.microsoft.com/office/drawing/2014/main" id="{D3D1963C-8418-0D7B-6079-C3C8745D3148}"/>
+              <a16:creationId xmlns:a16="http://schemas.microsoft.com/office/drawing/2014/main" id="{C9BC7226-4035-8835-4B7A-2A63A7665BB8}"/>
             </a:ext>
           </a:extLst>
         </p:cNvPr>
@@ -5610,7 +6525,7 @@
           <p:cNvPr id="2" name="Title 1">
             <a:extLst>
               <a:ext uri="{FF2B5EF4-FFF2-40B4-BE49-F238E27FC236}">
-                <a16:creationId xmlns:a16="http://schemas.microsoft.com/office/drawing/2014/main" id="{9C9FEB7E-D1A4-DD33-52E1-A121CA8136BF}"/>
+                <a16:creationId xmlns:a16="http://schemas.microsoft.com/office/drawing/2014/main" id="{B82C33C1-3E21-9BA8-9479-F364B26E57D9}"/>
               </a:ext>
             </a:extLst>
           </p:cNvPr>
@@ -5628,7 +6543,7 @@
           <a:p>
             <a:r>
               <a:rPr lang="en-US" dirty="0"/>
-              <a:t>Queue ADT</a:t>
+              <a:t>Stack ADT</a:t>
             </a:r>
           </a:p>
         </p:txBody>
@@ -5638,7 +6553,7 @@
           <p:cNvPr id="3" name="Content Placeholder 2">
             <a:extLst>
               <a:ext uri="{FF2B5EF4-FFF2-40B4-BE49-F238E27FC236}">
-                <a16:creationId xmlns:a16="http://schemas.microsoft.com/office/drawing/2014/main" id="{7090D9D0-C11A-B753-11EE-B150AEEFC7DA}"/>
+                <a16:creationId xmlns:a16="http://schemas.microsoft.com/office/drawing/2014/main" id="{8E4FE0C3-8402-BD8B-C451-2A6C3A057C6F}"/>
               </a:ext>
             </a:extLst>
           </p:cNvPr>
@@ -5667,7 +6582,7 @@
           <a:p>
             <a:r>
               <a:rPr lang="en-US" dirty="0"/>
-              <a:t>add</a:t>
+              <a:t>push</a:t>
             </a:r>
           </a:p>
         </p:txBody>
@@ -5677,7 +6592,7 @@
           <p:cNvPr id="4" name="Content Placeholder 3">
             <a:extLst>
               <a:ext uri="{FF2B5EF4-FFF2-40B4-BE49-F238E27FC236}">
-                <a16:creationId xmlns:a16="http://schemas.microsoft.com/office/drawing/2014/main" id="{CAFEB7B8-EB36-4B07-F1BA-11DE74511CC3}"/>
+                <a16:creationId xmlns:a16="http://schemas.microsoft.com/office/drawing/2014/main" id="{9B02C49D-B0D4-0811-8F24-F58D2FD698D7}"/>
               </a:ext>
             </a:extLst>
           </p:cNvPr>
@@ -5700,7 +6615,7 @@
           <a:p>
             <a:r>
               <a:rPr lang="en-US" dirty="0"/>
-              <a:t>remove</a:t>
+              <a:t>pop</a:t>
             </a:r>
           </a:p>
           <a:p>
@@ -5722,7 +6637,7 @@
           <p:cNvPr id="5" name="TextBox 4">
             <a:extLst>
               <a:ext uri="{FF2B5EF4-FFF2-40B4-BE49-F238E27FC236}">
-                <a16:creationId xmlns:a16="http://schemas.microsoft.com/office/drawing/2014/main" id="{E14BFD4F-7E2C-E257-3882-A777504E5A6B}"/>
+                <a16:creationId xmlns:a16="http://schemas.microsoft.com/office/drawing/2014/main" id="{8D44E9D3-ADFD-56F5-EA77-EC1EA7EF2986}"/>
               </a:ext>
             </a:extLst>
           </p:cNvPr>
@@ -5754,7 +6669,7 @@
             </a:pPr>
             <a:r>
               <a:rPr lang="en-US" dirty="0"/>
-              <a:t>A queue models a line of object</a:t>
+              <a:t>A stack models a pile of objects</a:t>
             </a:r>
           </a:p>
           <a:p>
@@ -5767,7 +6682,7 @@
             </a:pPr>
             <a:r>
               <a:rPr lang="en-US" dirty="0"/>
-              <a:t>Operates in a First In First Out Model - FIFO</a:t>
+              <a:t>Operates in a Last In First Out Model - LIFO</a:t>
             </a:r>
           </a:p>
           <a:p>
@@ -5788,172 +6703,7 @@
     </p:spTree>
     <p:extLst>
       <p:ext uri="{BB962C8B-B14F-4D97-AF65-F5344CB8AC3E}">
-        <p14:creationId xmlns:p14="http://schemas.microsoft.com/office/powerpoint/2010/main" val="3286999118"/>
-      </p:ext>
-    </p:extLst>
-  </p:cSld>
-  <p:clrMapOvr>
-    <a:masterClrMapping/>
-  </p:clrMapOvr>
-</p:sld>
-</file>
-
-<file path=ppt/slides/slide9.xml><?xml version="1.0" encoding="utf-8"?>
-<p:sld xmlns:a="http://schemas.openxmlformats.org/drawingml/2006/main" xmlns:r="http://schemas.openxmlformats.org/officeDocument/2006/relationships" xmlns:p="http://schemas.openxmlformats.org/presentationml/2006/main">
-  <p:cSld>
-    <p:spTree>
-      <p:nvGrpSpPr>
-        <p:cNvPr id="1" name=""/>
-        <p:cNvGrpSpPr/>
-        <p:nvPr/>
-      </p:nvGrpSpPr>
-      <p:grpSpPr>
-        <a:xfrm>
-          <a:off x="0" y="0"/>
-          <a:ext cx="0" cy="0"/>
-          <a:chOff x="0" y="0"/>
-          <a:chExt cx="0" cy="0"/>
-        </a:xfrm>
-      </p:grpSpPr>
-      <p:sp>
-        <p:nvSpPr>
-          <p:cNvPr id="2" name="Title 1">
-            <a:extLst>
-              <a:ext uri="{FF2B5EF4-FFF2-40B4-BE49-F238E27FC236}">
-                <a16:creationId xmlns:a16="http://schemas.microsoft.com/office/drawing/2014/main" id="{B96B7663-AA47-2C7D-0BD6-71F7058990FD}"/>
-              </a:ext>
-            </a:extLst>
-          </p:cNvPr>
-          <p:cNvSpPr>
-            <a:spLocks noGrp="1"/>
-          </p:cNvSpPr>
-          <p:nvPr>
-            <p:ph type="title"/>
-          </p:nvPr>
-        </p:nvSpPr>
-        <p:spPr/>
-        <p:txBody>
-          <a:bodyPr/>
-          <a:lstStyle/>
-          <a:p>
-            <a:r>
-              <a:rPr lang="en-US" dirty="0"/>
-              <a:t>Queue ADT</a:t>
-            </a:r>
-          </a:p>
-        </p:txBody>
-      </p:sp>
-      <p:sp>
-        <p:nvSpPr>
-          <p:cNvPr id="3" name="Content Placeholder 2">
-            <a:extLst>
-              <a:ext uri="{FF2B5EF4-FFF2-40B4-BE49-F238E27FC236}">
-                <a16:creationId xmlns:a16="http://schemas.microsoft.com/office/drawing/2014/main" id="{EBBA4960-2F98-90D1-0E23-CF2F0471185A}"/>
-              </a:ext>
-            </a:extLst>
-          </p:cNvPr>
-          <p:cNvSpPr>
-            <a:spLocks noGrp="1"/>
-          </p:cNvSpPr>
-          <p:nvPr>
-            <p:ph idx="1"/>
-          </p:nvPr>
-        </p:nvSpPr>
-        <p:spPr/>
-        <p:txBody>
-          <a:bodyPr/>
-          <a:lstStyle/>
-          <a:p>
-            <a:endParaRPr lang="en-US" dirty="0"/>
-          </a:p>
-        </p:txBody>
-      </p:sp>
-      <p:pic>
-        <p:nvPicPr>
-          <p:cNvPr id="4" name="Picture 3">
-            <a:extLst>
-              <a:ext uri="{FF2B5EF4-FFF2-40B4-BE49-F238E27FC236}">
-                <a16:creationId xmlns:a16="http://schemas.microsoft.com/office/drawing/2014/main" id="{08676C5A-4A98-BA74-718C-309740D30C15}"/>
-              </a:ext>
-            </a:extLst>
-          </p:cNvPr>
-          <p:cNvPicPr>
-            <a:picLocks noChangeAspect="1"/>
-          </p:cNvPicPr>
-          <p:nvPr/>
-        </p:nvPicPr>
-        <p:blipFill>
-          <a:blip r:embed="rId2"/>
-          <a:stretch>
-            <a:fillRect/>
-          </a:stretch>
-        </p:blipFill>
-        <p:spPr>
-          <a:xfrm>
-            <a:off x="70990" y="2968607"/>
-            <a:ext cx="12050020" cy="2214319"/>
-          </a:xfrm>
-          <a:prstGeom prst="rect">
-            <a:avLst/>
-          </a:prstGeom>
-        </p:spPr>
-      </p:pic>
-      <p:sp>
-        <p:nvSpPr>
-          <p:cNvPr id="5" name="Rectangle 4">
-            <a:extLst>
-              <a:ext uri="{FF2B5EF4-FFF2-40B4-BE49-F238E27FC236}">
-                <a16:creationId xmlns:a16="http://schemas.microsoft.com/office/drawing/2014/main" id="{728717E3-00BB-3421-E418-4B62E7717897}"/>
-              </a:ext>
-            </a:extLst>
-          </p:cNvPr>
-          <p:cNvSpPr/>
-          <p:nvPr/>
-        </p:nvSpPr>
-        <p:spPr>
-          <a:xfrm>
-            <a:off x="8072602" y="4770382"/>
-            <a:ext cx="661495" cy="243051"/>
-          </a:xfrm>
-          <a:prstGeom prst="rect">
-            <a:avLst/>
-          </a:prstGeom>
-          <a:noFill/>
-          <a:ln>
-            <a:solidFill>
-              <a:srgbClr val="FF0000"/>
-            </a:solidFill>
-          </a:ln>
-        </p:spPr>
-        <p:style>
-          <a:lnRef idx="2">
-            <a:schemeClr val="accent1">
-              <a:shade val="15000"/>
-            </a:schemeClr>
-          </a:lnRef>
-          <a:fillRef idx="1">
-            <a:schemeClr val="accent1"/>
-          </a:fillRef>
-          <a:effectRef idx="0">
-            <a:schemeClr val="accent1"/>
-          </a:effectRef>
-          <a:fontRef idx="minor">
-            <a:schemeClr val="lt1"/>
-          </a:fontRef>
-        </p:style>
-        <p:txBody>
-          <a:bodyPr rtlCol="0" anchor="ctr"/>
-          <a:lstStyle/>
-          <a:p>
-            <a:pPr algn="ctr"/>
-            <a:endParaRPr lang="en-US"/>
-          </a:p>
-        </p:txBody>
-      </p:sp>
-    </p:spTree>
-    <p:extLst>
-      <p:ext uri="{BB962C8B-B14F-4D97-AF65-F5344CB8AC3E}">
-        <p14:creationId xmlns:p14="http://schemas.microsoft.com/office/powerpoint/2010/main" val="1187269324"/>
+        <p14:creationId xmlns:p14="http://schemas.microsoft.com/office/powerpoint/2010/main" val="1222390579"/>
       </p:ext>
     </p:extLst>
   </p:cSld>

</xml_diff>